<commit_message>
bổ sung thêm thông tin
</commit_message>
<xml_diff>
--- a/docs/architect/EasyWeb.pptx
+++ b/docs/architect/EasyWeb.pptx
@@ -14,6 +14,8 @@
     <p:sldId id="263" r:id="rId8"/>
     <p:sldId id="264" r:id="rId9"/>
     <p:sldId id="265" r:id="rId10"/>
+    <p:sldId id="266" r:id="rId11"/>
+    <p:sldId id="267" r:id="rId12"/>
   </p:sldIdLst>
   <p:sldSz cx="12192000" cy="6858000"/>
   <p:notesSz cx="6858000" cy="9144000"/>
@@ -112,6 +114,11 @@
       </a:defRPr>
     </a:lvl9pPr>
   </p:defaultTextStyle>
+  <p:extLst>
+    <p:ext uri="{EFAFB233-063F-42B5-8137-9DF3F51BA10A}">
+      <p15:sldGuideLst xmlns:p15="http://schemas.microsoft.com/office/powerpoint/2012/main"/>
+    </p:ext>
+  </p:extLst>
 </p:presentation>
 </file>
 
@@ -246,7 +253,7 @@
           <a:p>
             <a:fld id="{2609F44E-82F4-4F80-A808-60299D5D6017}" type="datetimeFigureOut">
               <a:rPr lang="en-US" smtClean="0"/>
-              <a:t>25/12/2017</a:t>
+              <a:t>28/12/2017</a:t>
             </a:fld>
             <a:endParaRPr lang="en-US"/>
           </a:p>
@@ -416,7 +423,7 @@
           <a:p>
             <a:fld id="{2609F44E-82F4-4F80-A808-60299D5D6017}" type="datetimeFigureOut">
               <a:rPr lang="en-US" smtClean="0"/>
-              <a:t>25/12/2017</a:t>
+              <a:t>28/12/2017</a:t>
             </a:fld>
             <a:endParaRPr lang="en-US"/>
           </a:p>
@@ -596,7 +603,7 @@
           <a:p>
             <a:fld id="{2609F44E-82F4-4F80-A808-60299D5D6017}" type="datetimeFigureOut">
               <a:rPr lang="en-US" smtClean="0"/>
-              <a:t>25/12/2017</a:t>
+              <a:t>28/12/2017</a:t>
             </a:fld>
             <a:endParaRPr lang="en-US"/>
           </a:p>
@@ -766,7 +773,7 @@
           <a:p>
             <a:fld id="{2609F44E-82F4-4F80-A808-60299D5D6017}" type="datetimeFigureOut">
               <a:rPr lang="en-US" smtClean="0"/>
-              <a:t>25/12/2017</a:t>
+              <a:t>28/12/2017</a:t>
             </a:fld>
             <a:endParaRPr lang="en-US"/>
           </a:p>
@@ -1012,7 +1019,7 @@
           <a:p>
             <a:fld id="{2609F44E-82F4-4F80-A808-60299D5D6017}" type="datetimeFigureOut">
               <a:rPr lang="en-US" smtClean="0"/>
-              <a:t>25/12/2017</a:t>
+              <a:t>28/12/2017</a:t>
             </a:fld>
             <a:endParaRPr lang="en-US"/>
           </a:p>
@@ -1244,7 +1251,7 @@
           <a:p>
             <a:fld id="{2609F44E-82F4-4F80-A808-60299D5D6017}" type="datetimeFigureOut">
               <a:rPr lang="en-US" smtClean="0"/>
-              <a:t>25/12/2017</a:t>
+              <a:t>28/12/2017</a:t>
             </a:fld>
             <a:endParaRPr lang="en-US"/>
           </a:p>
@@ -1611,7 +1618,7 @@
           <a:p>
             <a:fld id="{2609F44E-82F4-4F80-A808-60299D5D6017}" type="datetimeFigureOut">
               <a:rPr lang="en-US" smtClean="0"/>
-              <a:t>25/12/2017</a:t>
+              <a:t>28/12/2017</a:t>
             </a:fld>
             <a:endParaRPr lang="en-US"/>
           </a:p>
@@ -1729,7 +1736,7 @@
           <a:p>
             <a:fld id="{2609F44E-82F4-4F80-A808-60299D5D6017}" type="datetimeFigureOut">
               <a:rPr lang="en-US" smtClean="0"/>
-              <a:t>25/12/2017</a:t>
+              <a:t>28/12/2017</a:t>
             </a:fld>
             <a:endParaRPr lang="en-US"/>
           </a:p>
@@ -1824,7 +1831,7 @@
           <a:p>
             <a:fld id="{2609F44E-82F4-4F80-A808-60299D5D6017}" type="datetimeFigureOut">
               <a:rPr lang="en-US" smtClean="0"/>
-              <a:t>25/12/2017</a:t>
+              <a:t>28/12/2017</a:t>
             </a:fld>
             <a:endParaRPr lang="en-US"/>
           </a:p>
@@ -2101,7 +2108,7 @@
           <a:p>
             <a:fld id="{2609F44E-82F4-4F80-A808-60299D5D6017}" type="datetimeFigureOut">
               <a:rPr lang="en-US" smtClean="0"/>
-              <a:t>25/12/2017</a:t>
+              <a:t>28/12/2017</a:t>
             </a:fld>
             <a:endParaRPr lang="en-US"/>
           </a:p>
@@ -2354,7 +2361,7 @@
           <a:p>
             <a:fld id="{2609F44E-82F4-4F80-A808-60299D5D6017}" type="datetimeFigureOut">
               <a:rPr lang="en-US" smtClean="0"/>
-              <a:t>25/12/2017</a:t>
+              <a:t>28/12/2017</a:t>
             </a:fld>
             <a:endParaRPr lang="en-US"/>
           </a:p>
@@ -2567,7 +2574,7 @@
           <a:p>
             <a:fld id="{2609F44E-82F4-4F80-A808-60299D5D6017}" type="datetimeFigureOut">
               <a:rPr lang="en-US" smtClean="0"/>
-              <a:t>25/12/2017</a:t>
+              <a:t>28/12/2017</a:t>
             </a:fld>
             <a:endParaRPr lang="en-US"/>
           </a:p>
@@ -3037,6 +3044,156 @@
 </p:sld>
 </file>
 
+<file path=ppt/slides/slide10.xml><?xml version="1.0" encoding="utf-8"?>
+<p:sld xmlns:a="http://schemas.openxmlformats.org/drawingml/2006/main" xmlns:r="http://schemas.openxmlformats.org/officeDocument/2006/relationships" xmlns:p="http://schemas.openxmlformats.org/presentationml/2006/main">
+  <p:cSld>
+    <p:spTree>
+      <p:nvGrpSpPr>
+        <p:cNvPr id="1" name=""/>
+        <p:cNvGrpSpPr/>
+        <p:nvPr/>
+      </p:nvGrpSpPr>
+      <p:grpSpPr>
+        <a:xfrm>
+          <a:off x="0" y="0"/>
+          <a:ext cx="0" cy="0"/>
+          <a:chOff x="0" y="0"/>
+          <a:chExt cx="0" cy="0"/>
+        </a:xfrm>
+      </p:grpSpPr>
+      <p:sp>
+        <p:nvSpPr>
+          <p:cNvPr id="2" name="Title 1"/>
+          <p:cNvSpPr>
+            <a:spLocks noGrp="1"/>
+          </p:cNvSpPr>
+          <p:nvPr>
+            <p:ph type="title"/>
+          </p:nvPr>
+        </p:nvSpPr>
+        <p:spPr/>
+        <p:txBody>
+          <a:bodyPr/>
+          <a:lstStyle/>
+          <a:p>
+            <a:r>
+              <a:rPr lang="en-US" smtClean="0"/>
+              <a:t>EasyPrototype: Phát triển phần mềm</a:t>
+            </a:r>
+            <a:endParaRPr lang="en-US"/>
+          </a:p>
+        </p:txBody>
+      </p:sp>
+      <p:pic>
+        <p:nvPicPr>
+          <p:cNvPr id="4" name="Content Placeholder 3"/>
+          <p:cNvPicPr>
+            <a:picLocks noGrp="1" noChangeAspect="1"/>
+          </p:cNvPicPr>
+          <p:nvPr>
+            <p:ph idx="1"/>
+          </p:nvPr>
+        </p:nvPicPr>
+        <p:blipFill>
+          <a:blip r:embed="rId2" cstate="print">
+            <a:extLst>
+              <a:ext uri="{28A0092B-C50C-407E-A947-70E740481C1C}">
+                <a14:useLocalDpi xmlns:a14="http://schemas.microsoft.com/office/drawing/2010/main" val="0"/>
+              </a:ext>
+            </a:extLst>
+          </a:blip>
+          <a:stretch>
+            <a:fillRect/>
+          </a:stretch>
+        </p:blipFill>
+        <p:spPr>
+          <a:xfrm>
+            <a:off x="1928553" y="1499488"/>
+            <a:ext cx="8001440" cy="4511220"/>
+          </a:xfrm>
+        </p:spPr>
+      </p:pic>
+    </p:spTree>
+    <p:extLst>
+      <p:ext uri="{BB962C8B-B14F-4D97-AF65-F5344CB8AC3E}">
+        <p14:creationId xmlns:p14="http://schemas.microsoft.com/office/powerpoint/2010/main" val="2979095984"/>
+      </p:ext>
+    </p:extLst>
+  </p:cSld>
+  <p:clrMapOvr>
+    <a:masterClrMapping/>
+  </p:clrMapOvr>
+</p:sld>
+</file>
+
+<file path=ppt/slides/slide11.xml><?xml version="1.0" encoding="utf-8"?>
+<p:sld xmlns:a="http://schemas.openxmlformats.org/drawingml/2006/main" xmlns:r="http://schemas.openxmlformats.org/officeDocument/2006/relationships" xmlns:p="http://schemas.openxmlformats.org/presentationml/2006/main">
+  <p:cSld>
+    <p:spTree>
+      <p:nvGrpSpPr>
+        <p:cNvPr id="1" name=""/>
+        <p:cNvGrpSpPr/>
+        <p:nvPr/>
+      </p:nvGrpSpPr>
+      <p:grpSpPr>
+        <a:xfrm>
+          <a:off x="0" y="0"/>
+          <a:ext cx="0" cy="0"/>
+          <a:chOff x="0" y="0"/>
+          <a:chExt cx="0" cy="0"/>
+        </a:xfrm>
+      </p:grpSpPr>
+      <p:sp>
+        <p:nvSpPr>
+          <p:cNvPr id="2" name="Title 1"/>
+          <p:cNvSpPr>
+            <a:spLocks noGrp="1"/>
+          </p:cNvSpPr>
+          <p:nvPr>
+            <p:ph type="title"/>
+          </p:nvPr>
+        </p:nvSpPr>
+        <p:spPr/>
+        <p:txBody>
+          <a:bodyPr/>
+          <a:lstStyle/>
+          <a:p>
+            <a:endParaRPr lang="en-US"/>
+          </a:p>
+        </p:txBody>
+      </p:sp>
+      <p:sp>
+        <p:nvSpPr>
+          <p:cNvPr id="3" name="Content Placeholder 2"/>
+          <p:cNvSpPr>
+            <a:spLocks noGrp="1"/>
+          </p:cNvSpPr>
+          <p:nvPr>
+            <p:ph idx="1"/>
+          </p:nvPr>
+        </p:nvSpPr>
+        <p:spPr/>
+        <p:txBody>
+          <a:bodyPr/>
+          <a:lstStyle/>
+          <a:p>
+            <a:endParaRPr lang="en-US"/>
+          </a:p>
+        </p:txBody>
+      </p:sp>
+    </p:spTree>
+    <p:extLst>
+      <p:ext uri="{BB962C8B-B14F-4D97-AF65-F5344CB8AC3E}">
+        <p14:creationId xmlns:p14="http://schemas.microsoft.com/office/powerpoint/2010/main" val="843453766"/>
+      </p:ext>
+    </p:extLst>
+  </p:cSld>
+  <p:clrMapOvr>
+    <a:masterClrMapping/>
+  </p:clrMapOvr>
+</p:sld>
+</file>
+
 <file path=ppt/slides/slide2.xml><?xml version="1.0" encoding="utf-8"?>
 <p:sld xmlns:a="http://schemas.openxmlformats.org/drawingml/2006/main" xmlns:r="http://schemas.openxmlformats.org/officeDocument/2006/relationships" xmlns:p="http://schemas.openxmlformats.org/presentationml/2006/main">
   <p:cSld>
@@ -4171,7 +4328,6 @@
               <a:rPr lang="en-US" smtClean="0"/>
               <a:t>Dùng chung phần đăng nhập, phân quyền truy cập</a:t>
             </a:r>
-            <a:endParaRPr lang="en-US" smtClean="0"/>
           </a:p>
           <a:p>
             <a:r>
@@ -4199,7 +4355,6 @@
               <a:rPr lang="en-US" smtClean="0"/>
               <a:t>tích hợp, mở rộng với các hệ thống khác của đối tác</a:t>
             </a:r>
-            <a:endParaRPr lang="en-US" smtClean="0"/>
           </a:p>
         </p:txBody>
       </p:sp>

</xml_diff>